<commit_message>
Up to Unit 7 updated
</commit_message>
<xml_diff>
--- a/Unit 4 Requirements Engineering.pptx
+++ b/Unit 4 Requirements Engineering.pptx
@@ -129,6 +129,35 @@
 </p:presentation>
 </file>
 
+<file path=ppt/changesInfos/changesInfo1.xml><?xml version="1.0" encoding="utf-8"?>
+<pc:chgInfo xmlns:a="http://schemas.openxmlformats.org/drawingml/2006/main" xmlns:r="http://schemas.openxmlformats.org/officeDocument/2006/relationships" xmlns:ac="http://schemas.microsoft.com/office/drawing/2013/main/command" xmlns:pc="http://schemas.microsoft.com/office/powerpoint/2013/main/command">
+  <pc:docChgLst>
+    <pc:chgData name="Natabar Khatri" userId="e95e786e96651ab4" providerId="LiveId" clId="{A6504D65-A241-441E-BA6F-1F54E5FBF3E2}"/>
+    <pc:docChg chg="modSld">
+      <pc:chgData name="Natabar Khatri" userId="e95e786e96651ab4" providerId="LiveId" clId="{A6504D65-A241-441E-BA6F-1F54E5FBF3E2}" dt="2025-08-11T16:40:38.355" v="1" actId="403"/>
+      <pc:docMkLst>
+        <pc:docMk/>
+      </pc:docMkLst>
+      <pc:sldChg chg="modSp mod">
+        <pc:chgData name="Natabar Khatri" userId="e95e786e96651ab4" providerId="LiveId" clId="{A6504D65-A241-441E-BA6F-1F54E5FBF3E2}" dt="2025-08-11T16:40:38.355" v="1" actId="403"/>
+        <pc:sldMkLst>
+          <pc:docMk/>
+          <pc:sldMk cId="3784354071" sldId="299"/>
+        </pc:sldMkLst>
+        <pc:spChg chg="mod">
+          <ac:chgData name="Natabar Khatri" userId="e95e786e96651ab4" providerId="LiveId" clId="{A6504D65-A241-441E-BA6F-1F54E5FBF3E2}" dt="2025-08-11T16:40:38.355" v="1" actId="403"/>
+          <ac:spMkLst>
+            <pc:docMk/>
+            <pc:sldMk cId="3784354071" sldId="299"/>
+            <ac:spMk id="5" creationId="{99B7AE85-2774-BD64-BEE2-B4635B6C5F75}"/>
+          </ac:spMkLst>
+        </pc:spChg>
+      </pc:sldChg>
+    </pc:docChg>
+  </pc:docChgLst>
+</pc:chgInfo>
+</file>
+
 <file path=ppt/notesMasters/notesMaster1.xml><?xml version="1.0" encoding="utf-8"?>
 <p:notesMaster xmlns:a="http://schemas.openxmlformats.org/drawingml/2006/main" xmlns:r="http://schemas.openxmlformats.org/officeDocument/2006/relationships" xmlns:p="http://schemas.openxmlformats.org/presentationml/2006/main">
   <p:cSld>
@@ -211,7 +240,7 @@
           <a:p>
             <a:fld id="{AA5DF6BD-12FA-4C0F-9014-1912F3884311}" type="datetimeFigureOut">
               <a:rPr lang="en-US" smtClean="0"/>
-              <a:t>7/16/2025</a:t>
+              <a:t>8/11/2025</a:t>
             </a:fld>
             <a:endParaRPr lang="en-US"/>
           </a:p>
@@ -2435,7 +2464,7 @@
           <a:p>
             <a:fld id="{88FF98CE-4BC3-4B0F-980A-5AEFDE942DB0}" type="datetimeFigureOut">
               <a:rPr lang="en-US" smtClean="0"/>
-              <a:t>7/16/2025</a:t>
+              <a:t>8/11/2025</a:t>
             </a:fld>
             <a:endParaRPr lang="en-US"/>
           </a:p>
@@ -2614,7 +2643,7 @@
           <a:p>
             <a:fld id="{88FF98CE-4BC3-4B0F-980A-5AEFDE942DB0}" type="datetimeFigureOut">
               <a:rPr lang="en-US" smtClean="0"/>
-              <a:t>7/16/2025</a:t>
+              <a:t>8/11/2025</a:t>
             </a:fld>
             <a:endParaRPr lang="en-US"/>
           </a:p>
@@ -2794,7 +2823,7 @@
           <a:p>
             <a:fld id="{88FF98CE-4BC3-4B0F-980A-5AEFDE942DB0}" type="datetimeFigureOut">
               <a:rPr lang="en-US" smtClean="0"/>
-              <a:t>7/16/2025</a:t>
+              <a:t>8/11/2025</a:t>
             </a:fld>
             <a:endParaRPr lang="en-US"/>
           </a:p>
@@ -2964,7 +2993,7 @@
           <a:p>
             <a:fld id="{88FF98CE-4BC3-4B0F-980A-5AEFDE942DB0}" type="datetimeFigureOut">
               <a:rPr lang="en-US" smtClean="0"/>
-              <a:t>7/16/2025</a:t>
+              <a:t>8/11/2025</a:t>
             </a:fld>
             <a:endParaRPr lang="en-US"/>
           </a:p>
@@ -3277,7 +3306,7 @@
           <a:p>
             <a:fld id="{88FF98CE-4BC3-4B0F-980A-5AEFDE942DB0}" type="datetimeFigureOut">
               <a:rPr lang="en-US" smtClean="0"/>
-              <a:t>7/16/2025</a:t>
+              <a:t>8/11/2025</a:t>
             </a:fld>
             <a:endParaRPr lang="en-US"/>
           </a:p>
@@ -3663,7 +3692,7 @@
           <a:p>
             <a:fld id="{88FF98CE-4BC3-4B0F-980A-5AEFDE942DB0}" type="datetimeFigureOut">
               <a:rPr lang="en-US" smtClean="0"/>
-              <a:t>7/16/2025</a:t>
+              <a:t>8/11/2025</a:t>
             </a:fld>
             <a:endParaRPr lang="en-US"/>
           </a:p>
@@ -4097,7 +4126,7 @@
           <a:p>
             <a:fld id="{88FF98CE-4BC3-4B0F-980A-5AEFDE942DB0}" type="datetimeFigureOut">
               <a:rPr lang="en-US" smtClean="0"/>
-              <a:t>7/16/2025</a:t>
+              <a:t>8/11/2025</a:t>
             </a:fld>
             <a:endParaRPr lang="en-US"/>
           </a:p>
@@ -4215,7 +4244,7 @@
           <a:p>
             <a:fld id="{88FF98CE-4BC3-4B0F-980A-5AEFDE942DB0}" type="datetimeFigureOut">
               <a:rPr lang="en-US" smtClean="0"/>
-              <a:t>7/16/2025</a:t>
+              <a:t>8/11/2025</a:t>
             </a:fld>
             <a:endParaRPr lang="en-US"/>
           </a:p>
@@ -4310,7 +4339,7 @@
           <a:p>
             <a:fld id="{88FF98CE-4BC3-4B0F-980A-5AEFDE942DB0}" type="datetimeFigureOut">
               <a:rPr lang="en-US" smtClean="0"/>
-              <a:t>7/16/2025</a:t>
+              <a:t>8/11/2025</a:t>
             </a:fld>
             <a:endParaRPr lang="en-US"/>
           </a:p>
@@ -4660,7 +4689,7 @@
           <a:p>
             <a:fld id="{88FF98CE-4BC3-4B0F-980A-5AEFDE942DB0}" type="datetimeFigureOut">
               <a:rPr lang="en-US" smtClean="0"/>
-              <a:t>7/16/2025</a:t>
+              <a:t>8/11/2025</a:t>
             </a:fld>
             <a:endParaRPr lang="en-US"/>
           </a:p>
@@ -5085,7 +5114,7 @@
           <a:p>
             <a:fld id="{88FF98CE-4BC3-4B0F-980A-5AEFDE942DB0}" type="datetimeFigureOut">
               <a:rPr lang="en-US" smtClean="0"/>
-              <a:t>7/16/2025</a:t>
+              <a:t>8/11/2025</a:t>
             </a:fld>
             <a:endParaRPr lang="en-US"/>
           </a:p>
@@ -5366,7 +5395,7 @@
           <a:p>
             <a:fld id="{88FF98CE-4BC3-4B0F-980A-5AEFDE942DB0}" type="datetimeFigureOut">
               <a:rPr lang="en-US" smtClean="0"/>
-              <a:t>7/16/2025</a:t>
+              <a:t>8/11/2025</a:t>
             </a:fld>
             <a:endParaRPr lang="en-US"/>
           </a:p>
@@ -7295,7 +7324,7 @@
           <a:lstStyle/>
           <a:p>
             <a:r>
-              <a:rPr lang="en-US" dirty="0">
+              <a:rPr lang="en-US" sz="2400" dirty="0">
                 <a:latin typeface="Times New Roman" panose="02020603050405020304" pitchFamily="18" charset="0"/>
                 <a:cs typeface="Times New Roman" panose="02020603050405020304" pitchFamily="18" charset="0"/>
               </a:rPr>
@@ -7304,7 +7333,7 @@
           </a:p>
           <a:p>
             <a:r>
-              <a:rPr lang="en-US" dirty="0">
+              <a:rPr lang="en-US" sz="2400" dirty="0">
                 <a:latin typeface="Times New Roman" panose="02020603050405020304" pitchFamily="18" charset="0"/>
                 <a:cs typeface="Times New Roman" panose="02020603050405020304" pitchFamily="18" charset="0"/>
               </a:rPr>
@@ -7314,7 +7343,7 @@
           <a:p>
             <a:pPr lvl="0"/>
             <a:r>
-              <a:rPr lang="en-US" b="1" dirty="0">
+              <a:rPr lang="en-US" sz="2400" b="1" dirty="0">
                 <a:latin typeface="Times New Roman" panose="02020603050405020304" pitchFamily="18" charset="0"/>
                 <a:cs typeface="Times New Roman" panose="02020603050405020304" pitchFamily="18" charset="0"/>
               </a:rPr>
@@ -7323,7 +7352,7 @@
           </a:p>
           <a:p>
             <a:r>
-              <a:rPr lang="en-US" dirty="0">
+              <a:rPr lang="en-US" sz="2400" dirty="0">
                 <a:latin typeface="Times New Roman" panose="02020603050405020304" pitchFamily="18" charset="0"/>
                 <a:cs typeface="Times New Roman" panose="02020603050405020304" pitchFamily="18" charset="0"/>
               </a:rPr>
@@ -7332,61 +7361,12 @@
           </a:p>
           <a:p>
             <a:r>
-              <a:rPr lang="en-US" dirty="0">
+              <a:rPr lang="en-US" sz="2400" dirty="0">
                 <a:latin typeface="Times New Roman" panose="02020603050405020304" pitchFamily="18" charset="0"/>
                 <a:cs typeface="Times New Roman" panose="02020603050405020304" pitchFamily="18" charset="0"/>
               </a:rPr>
               <a:t>These help to understand the system to be specified.</a:t>
             </a:r>
-          </a:p>
-          <a:p>
-            <a:pPr lvl="0"/>
-            <a:r>
-              <a:rPr lang="en-US" b="1" dirty="0">
-                <a:latin typeface="Times New Roman" panose="02020603050405020304" pitchFamily="18" charset="0"/>
-                <a:cs typeface="Times New Roman" panose="02020603050405020304" pitchFamily="18" charset="0"/>
-              </a:rPr>
-              <a:t>Requirements Analysis and Specification</a:t>
-            </a:r>
-          </a:p>
-          <a:p>
-            <a:r>
-              <a:rPr lang="en-US" dirty="0">
-                <a:latin typeface="Times New Roman" panose="02020603050405020304" pitchFamily="18" charset="0"/>
-                <a:cs typeface="Times New Roman" panose="02020603050405020304" pitchFamily="18" charset="0"/>
-              </a:rPr>
-              <a:t>The elicited needs are converted into structured documentation. Two types of requirements may be included in this document. User requirements are abstract statements of the system requirements for the customer and end-user of the system; system requirements are a more detailed description of the functionality to be provided.</a:t>
-            </a:r>
-          </a:p>
-          <a:p>
-            <a:pPr lvl="0"/>
-            <a:r>
-              <a:rPr lang="en-US" b="1" dirty="0">
-                <a:latin typeface="Times New Roman" panose="02020603050405020304" pitchFamily="18" charset="0"/>
-                <a:cs typeface="Times New Roman" panose="02020603050405020304" pitchFamily="18" charset="0"/>
-              </a:rPr>
-              <a:t>Requirements Validation</a:t>
-            </a:r>
-          </a:p>
-          <a:p>
-            <a:r>
-              <a:rPr lang="en-US" dirty="0">
-                <a:latin typeface="Times New Roman" panose="02020603050405020304" pitchFamily="18" charset="0"/>
-                <a:cs typeface="Times New Roman" panose="02020603050405020304" pitchFamily="18" charset="0"/>
-              </a:rPr>
-              <a:t>The main goal of requirements validation is to ensure requirements are correct, complete, and aligned with stakeholder needs. During this process, errors in the requirements document are inevitably discovered. It must then be modified to correct these problems.</a:t>
-            </a:r>
-          </a:p>
-          <a:p>
-            <a:pPr>
-              <a:lnSpc>
-                <a:spcPct val="110000"/>
-              </a:lnSpc>
-            </a:pPr>
-            <a:endParaRPr lang="en-US" dirty="0">
-              <a:latin typeface="Times New Roman" panose="02020603050405020304" pitchFamily="18" charset="0"/>
-              <a:cs typeface="Times New Roman" panose="02020603050405020304" pitchFamily="18" charset="0"/>
-            </a:endParaRPr>
           </a:p>
         </p:txBody>
       </p:sp>

</xml_diff>